<commit_message>
Centralize .NET solution and project reference generation
Refactor code generation architecture to introduce DotNetSolutionArtifact and DotNetSolutionGenerator, enabling automatic .sln file creation and project reference management. Add ScopeDotNetProjectReferences for cross-layer/scope tracking. Update DotNetProjectArtifact and templates to support project references. Add settings event handling and improve generator enable/disable logic. Update resources and tests for new solution/project structure. Old per-project file generation is now handled centrally.
</commit_message>
<xml_diff>
--- a/docs/Software Architecture/Code Architecture Layers.pptx
+++ b/docs/Software Architecture/Code Architecture Layers.pptx
@@ -261,7 +261,7 @@
           <a:p>
             <a:fld id="{BC5BAD28-58C4-49D1-97C7-3A2CD9CB57AC}" type="datetimeFigureOut">
               <a:rPr lang="nl-BE" smtClean="0"/>
-              <a:t>27/01/2026</a:t>
+              <a:t>31/01/2026</a:t>
             </a:fld>
             <a:endParaRPr lang="nl-BE"/>
           </a:p>
@@ -461,7 +461,7 @@
           <a:p>
             <a:fld id="{BC5BAD28-58C4-49D1-97C7-3A2CD9CB57AC}" type="datetimeFigureOut">
               <a:rPr lang="nl-BE" smtClean="0"/>
-              <a:t>27/01/2026</a:t>
+              <a:t>31/01/2026</a:t>
             </a:fld>
             <a:endParaRPr lang="nl-BE"/>
           </a:p>
@@ -671,7 +671,7 @@
           <a:p>
             <a:fld id="{BC5BAD28-58C4-49D1-97C7-3A2CD9CB57AC}" type="datetimeFigureOut">
               <a:rPr lang="nl-BE" smtClean="0"/>
-              <a:t>27/01/2026</a:t>
+              <a:t>31/01/2026</a:t>
             </a:fld>
             <a:endParaRPr lang="nl-BE"/>
           </a:p>
@@ -871,7 +871,7 @@
           <a:p>
             <a:fld id="{BC5BAD28-58C4-49D1-97C7-3A2CD9CB57AC}" type="datetimeFigureOut">
               <a:rPr lang="nl-BE" smtClean="0"/>
-              <a:t>27/01/2026</a:t>
+              <a:t>31/01/2026</a:t>
             </a:fld>
             <a:endParaRPr lang="nl-BE"/>
           </a:p>
@@ -1147,7 +1147,7 @@
           <a:p>
             <a:fld id="{BC5BAD28-58C4-49D1-97C7-3A2CD9CB57AC}" type="datetimeFigureOut">
               <a:rPr lang="nl-BE" smtClean="0"/>
-              <a:t>27/01/2026</a:t>
+              <a:t>31/01/2026</a:t>
             </a:fld>
             <a:endParaRPr lang="nl-BE"/>
           </a:p>
@@ -1415,7 +1415,7 @@
           <a:p>
             <a:fld id="{BC5BAD28-58C4-49D1-97C7-3A2CD9CB57AC}" type="datetimeFigureOut">
               <a:rPr lang="nl-BE" smtClean="0"/>
-              <a:t>27/01/2026</a:t>
+              <a:t>31/01/2026</a:t>
             </a:fld>
             <a:endParaRPr lang="nl-BE"/>
           </a:p>
@@ -1830,7 +1830,7 @@
           <a:p>
             <a:fld id="{BC5BAD28-58C4-49D1-97C7-3A2CD9CB57AC}" type="datetimeFigureOut">
               <a:rPr lang="nl-BE" smtClean="0"/>
-              <a:t>27/01/2026</a:t>
+              <a:t>31/01/2026</a:t>
             </a:fld>
             <a:endParaRPr lang="nl-BE"/>
           </a:p>
@@ -1972,7 +1972,7 @@
           <a:p>
             <a:fld id="{BC5BAD28-58C4-49D1-97C7-3A2CD9CB57AC}" type="datetimeFigureOut">
               <a:rPr lang="nl-BE" smtClean="0"/>
-              <a:t>27/01/2026</a:t>
+              <a:t>31/01/2026</a:t>
             </a:fld>
             <a:endParaRPr lang="nl-BE"/>
           </a:p>
@@ -2085,7 +2085,7 @@
           <a:p>
             <a:fld id="{BC5BAD28-58C4-49D1-97C7-3A2CD9CB57AC}" type="datetimeFigureOut">
               <a:rPr lang="nl-BE" smtClean="0"/>
-              <a:t>27/01/2026</a:t>
+              <a:t>31/01/2026</a:t>
             </a:fld>
             <a:endParaRPr lang="nl-BE"/>
           </a:p>
@@ -2398,7 +2398,7 @@
           <a:p>
             <a:fld id="{BC5BAD28-58C4-49D1-97C7-3A2CD9CB57AC}" type="datetimeFigureOut">
               <a:rPr lang="nl-BE" smtClean="0"/>
-              <a:t>27/01/2026</a:t>
+              <a:t>31/01/2026</a:t>
             </a:fld>
             <a:endParaRPr lang="nl-BE"/>
           </a:p>
@@ -2687,7 +2687,7 @@
           <a:p>
             <a:fld id="{BC5BAD28-58C4-49D1-97C7-3A2CD9CB57AC}" type="datetimeFigureOut">
               <a:rPr lang="nl-BE" smtClean="0"/>
-              <a:t>27/01/2026</a:t>
+              <a:t>31/01/2026</a:t>
             </a:fld>
             <a:endParaRPr lang="nl-BE"/>
           </a:p>
@@ -2930,7 +2930,7 @@
           <a:p>
             <a:fld id="{BC5BAD28-58C4-49D1-97C7-3A2CD9CB57AC}" type="datetimeFigureOut">
               <a:rPr lang="nl-BE" smtClean="0"/>
-              <a:t>27/01/2026</a:t>
+              <a:t>31/01/2026</a:t>
             </a:fld>
             <a:endParaRPr lang="nl-BE"/>
           </a:p>
@@ -3560,14 +3560,26 @@
           <a:lstStyle/>
           <a:p>
             <a:r>
-              <a:rPr lang="nl-BE" dirty="0"/>
+              <a:rPr lang="nl-BE" dirty="0">
+                <a:solidFill>
+                  <a:schemeClr val="bg1"/>
+                </a:solidFill>
+              </a:rPr>
               <a:t>Presentation </a:t>
             </a:r>
             <a:r>
-              <a:rPr lang="nl-BE" dirty="0" err="1"/>
+              <a:rPr lang="nl-BE" dirty="0" err="1">
+                <a:solidFill>
+                  <a:schemeClr val="bg1"/>
+                </a:solidFill>
+              </a:rPr>
               <a:t>Layer</a:t>
             </a:r>
-            <a:endParaRPr lang="nl-BE" dirty="0"/>
+            <a:endParaRPr lang="nl-BE" dirty="0">
+              <a:solidFill>
+                <a:schemeClr val="bg1"/>
+              </a:solidFill>
+            </a:endParaRPr>
           </a:p>
         </p:txBody>
       </p:sp>
@@ -3600,14 +3612,26 @@
           <a:lstStyle/>
           <a:p>
             <a:r>
-              <a:rPr lang="nl-BE" dirty="0"/>
+              <a:rPr lang="nl-BE" dirty="0">
+                <a:solidFill>
+                  <a:schemeClr val="bg1"/>
+                </a:solidFill>
+              </a:rPr>
               <a:t>Application </a:t>
             </a:r>
             <a:r>
-              <a:rPr lang="nl-BE" dirty="0" err="1"/>
+              <a:rPr lang="nl-BE" dirty="0" err="1">
+                <a:solidFill>
+                  <a:schemeClr val="bg1"/>
+                </a:solidFill>
+              </a:rPr>
               <a:t>Layer</a:t>
             </a:r>
-            <a:endParaRPr lang="nl-BE" dirty="0"/>
+            <a:endParaRPr lang="nl-BE" dirty="0">
+              <a:solidFill>
+                <a:schemeClr val="bg1"/>
+              </a:solidFill>
+            </a:endParaRPr>
           </a:p>
         </p:txBody>
       </p:sp>
@@ -3640,14 +3664,34 @@
           <a:lstStyle/>
           <a:p>
             <a:r>
-              <a:rPr lang="nl-BE" dirty="0"/>
-              <a:t>Domain </a:t>
-            </a:r>
-            <a:r>
-              <a:rPr lang="nl-BE" dirty="0" err="1"/>
+              <a:rPr lang="nl-BE" dirty="0" err="1">
+                <a:solidFill>
+                  <a:schemeClr val="bg1"/>
+                </a:solidFill>
+              </a:rPr>
+              <a:t>Infrastructure</a:t>
+            </a:r>
+            <a:r>
+              <a:rPr lang="nl-BE" dirty="0">
+                <a:solidFill>
+                  <a:schemeClr val="bg1"/>
+                </a:solidFill>
+              </a:rPr>
+              <a:t> </a:t>
+            </a:r>
+            <a:r>
+              <a:rPr lang="nl-BE" dirty="0" err="1">
+                <a:solidFill>
+                  <a:schemeClr val="bg1"/>
+                </a:solidFill>
+              </a:rPr>
               <a:t>Layer</a:t>
             </a:r>
-            <a:endParaRPr lang="nl-BE" dirty="0"/>
+            <a:endParaRPr lang="nl-BE" dirty="0">
+              <a:solidFill>
+                <a:schemeClr val="bg1"/>
+              </a:solidFill>
+            </a:endParaRPr>
           </a:p>
         </p:txBody>
       </p:sp>
@@ -3680,18 +3724,26 @@
           <a:lstStyle/>
           <a:p>
             <a:r>
-              <a:rPr lang="nl-BE" dirty="0" err="1"/>
-              <a:t>Infrastructure</a:t>
-            </a:r>
-            <a:r>
-              <a:rPr lang="nl-BE" dirty="0"/>
-              <a:t> </a:t>
-            </a:r>
-            <a:r>
-              <a:rPr lang="nl-BE" dirty="0" err="1"/>
+              <a:rPr lang="nl-BE" dirty="0">
+                <a:solidFill>
+                  <a:schemeClr val="bg1"/>
+                </a:solidFill>
+              </a:rPr>
+              <a:t>Domain </a:t>
+            </a:r>
+            <a:r>
+              <a:rPr lang="nl-BE" dirty="0" err="1">
+                <a:solidFill>
+                  <a:schemeClr val="bg1"/>
+                </a:solidFill>
+              </a:rPr>
               <a:t>Layer</a:t>
             </a:r>
-            <a:endParaRPr lang="nl-BE" dirty="0"/>
+            <a:endParaRPr lang="nl-BE" dirty="0">
+              <a:solidFill>
+                <a:schemeClr val="bg1"/>
+              </a:solidFill>
+            </a:endParaRPr>
           </a:p>
         </p:txBody>
       </p:sp>
@@ -3795,10 +3847,10 @@
       </p:sp>
       <p:sp>
         <p:nvSpPr>
-          <p:cNvPr id="14" name="Rechthoek 13">
-            <a:extLst>
-              <a:ext uri="{FF2B5EF4-FFF2-40B4-BE49-F238E27FC236}">
-                <a16:creationId xmlns:a16="http://schemas.microsoft.com/office/drawing/2014/main" id="{3A2A82CD-683D-7B18-03BD-ED04EDC78E83}"/>
+          <p:cNvPr id="20" name="Pijl: rechts 19">
+            <a:extLst>
+              <a:ext uri="{FF2B5EF4-FFF2-40B4-BE49-F238E27FC236}">
+                <a16:creationId xmlns:a16="http://schemas.microsoft.com/office/drawing/2014/main" id="{47570352-4071-B527-2D50-0009671B9B3F}"/>
               </a:ext>
             </a:extLst>
           </p:cNvPr>
@@ -3806,9 +3858,409 @@
           <p:nvPr/>
         </p:nvSpPr>
         <p:spPr>
+          <a:xfrm rot="10800000">
+            <a:off x="10852927" y="4005527"/>
+            <a:ext cx="482885" cy="369332"/>
+          </a:xfrm>
+          <a:prstGeom prst="rightArrow">
+            <a:avLst/>
+          </a:prstGeom>
+        </p:spPr>
+        <p:style>
+          <a:lnRef idx="2">
+            <a:schemeClr val="accent1">
+              <a:shade val="15000"/>
+            </a:schemeClr>
+          </a:lnRef>
+          <a:fillRef idx="1">
+            <a:schemeClr val="accent1"/>
+          </a:fillRef>
+          <a:effectRef idx="0">
+            <a:schemeClr val="accent1"/>
+          </a:effectRef>
+          <a:fontRef idx="minor">
+            <a:schemeClr val="lt1"/>
+          </a:fontRef>
+        </p:style>
+        <p:txBody>
+          <a:bodyPr rtlCol="0" anchor="ctr"/>
+          <a:lstStyle/>
+          <a:p>
+            <a:pPr algn="ctr"/>
+            <a:endParaRPr lang="nl-BE"/>
+          </a:p>
+        </p:txBody>
+      </p:sp>
+      <p:sp>
+        <p:nvSpPr>
+          <p:cNvPr id="21" name="Tekstvak 20">
+            <a:extLst>
+              <a:ext uri="{FF2B5EF4-FFF2-40B4-BE49-F238E27FC236}">
+                <a16:creationId xmlns:a16="http://schemas.microsoft.com/office/drawing/2014/main" id="{64DEB639-DF27-6162-5300-A8995A04D7C6}"/>
+              </a:ext>
+            </a:extLst>
+          </p:cNvPr>
+          <p:cNvSpPr txBox="1"/>
+          <p:nvPr/>
+        </p:nvSpPr>
+        <p:spPr>
           <a:xfrm>
-            <a:off x="3559996" y="287676"/>
+            <a:off x="11337524" y="4005527"/>
+            <a:ext cx="847623" cy="369332"/>
+          </a:xfrm>
+          <a:prstGeom prst="rect">
+            <a:avLst/>
+          </a:prstGeom>
+          <a:noFill/>
+        </p:spPr>
+        <p:txBody>
+          <a:bodyPr wrap="square" rtlCol="0">
+            <a:spAutoFit/>
+          </a:bodyPr>
+          <a:lstStyle/>
+          <a:p>
+            <a:r>
+              <a:rPr lang="nl-BE" dirty="0">
+                <a:solidFill>
+                  <a:srgbClr val="FF0000"/>
+                </a:solidFill>
+              </a:rPr>
+              <a:t>Scope</a:t>
+            </a:r>
+          </a:p>
+        </p:txBody>
+      </p:sp>
+      <p:grpSp>
+        <p:nvGrpSpPr>
+          <p:cNvPr id="48" name="Groep 47">
+            <a:extLst>
+              <a:ext uri="{FF2B5EF4-FFF2-40B4-BE49-F238E27FC236}">
+                <a16:creationId xmlns:a16="http://schemas.microsoft.com/office/drawing/2014/main" id="{B91C9726-6B2F-7D56-1439-07A5A974CF5F}"/>
+              </a:ext>
+            </a:extLst>
+          </p:cNvPr>
+          <p:cNvGrpSpPr/>
+          <p:nvPr/>
+        </p:nvGrpSpPr>
+        <p:grpSpPr>
+          <a:xfrm>
+            <a:off x="5387086" y="287676"/>
             <a:ext cx="2044557" cy="4536042"/>
+            <a:chOff x="5993259" y="287676"/>
+            <a:chExt cx="2044557" cy="4536042"/>
+          </a:xfrm>
+        </p:grpSpPr>
+        <p:sp>
+          <p:nvSpPr>
+            <p:cNvPr id="16" name="Rechthoek 15">
+              <a:extLst>
+                <a:ext uri="{FF2B5EF4-FFF2-40B4-BE49-F238E27FC236}">
+                  <a16:creationId xmlns:a16="http://schemas.microsoft.com/office/drawing/2014/main" id="{EDCCFDFC-AC96-659C-319C-DB14A7AC09A7}"/>
+                </a:ext>
+              </a:extLst>
+            </p:cNvPr>
+            <p:cNvSpPr/>
+            <p:nvPr/>
+          </p:nvSpPr>
+          <p:spPr>
+            <a:xfrm>
+              <a:off x="5993259" y="287676"/>
+              <a:ext cx="2044557" cy="4536042"/>
+            </a:xfrm>
+            <a:prstGeom prst="rect">
+              <a:avLst/>
+            </a:prstGeom>
+            <a:solidFill>
+              <a:schemeClr val="accent1">
+                <a:alpha val="46000"/>
+              </a:schemeClr>
+            </a:solidFill>
+          </p:spPr>
+          <p:style>
+            <a:lnRef idx="2">
+              <a:schemeClr val="accent1">
+                <a:shade val="15000"/>
+              </a:schemeClr>
+            </a:lnRef>
+            <a:fillRef idx="1">
+              <a:schemeClr val="accent1"/>
+            </a:fillRef>
+            <a:effectRef idx="0">
+              <a:schemeClr val="accent1"/>
+            </a:effectRef>
+            <a:fontRef idx="minor">
+              <a:schemeClr val="lt1"/>
+            </a:fontRef>
+          </p:style>
+          <p:txBody>
+            <a:bodyPr rtlCol="0" anchor="ctr"/>
+            <a:lstStyle/>
+            <a:p>
+              <a:pPr algn="ctr"/>
+              <a:endParaRPr lang="nl-BE">
+                <a:ln w="0"/>
+                <a:solidFill>
+                  <a:schemeClr val="tx1"/>
+                </a:solidFill>
+                <a:effectLst>
+                  <a:outerShdw blurRad="38100" dist="19050" dir="2700000" algn="tl" rotWithShape="0">
+                    <a:schemeClr val="dk1">
+                      <a:alpha val="40000"/>
+                    </a:schemeClr>
+                  </a:outerShdw>
+                </a:effectLst>
+              </a:endParaRPr>
+            </a:p>
+          </p:txBody>
+        </p:sp>
+        <p:sp>
+          <p:nvSpPr>
+            <p:cNvPr id="17" name="Tekstvak 16">
+              <a:extLst>
+                <a:ext uri="{FF2B5EF4-FFF2-40B4-BE49-F238E27FC236}">
+                  <a16:creationId xmlns:a16="http://schemas.microsoft.com/office/drawing/2014/main" id="{E1D32CC7-1FDD-1AF9-5DDA-5D1C359FE826}"/>
+                </a:ext>
+              </a:extLst>
+            </p:cNvPr>
+            <p:cNvSpPr txBox="1"/>
+            <p:nvPr/>
+          </p:nvSpPr>
+          <p:spPr>
+            <a:xfrm>
+              <a:off x="6369979" y="4065619"/>
+              <a:ext cx="1332217" cy="369332"/>
+            </a:xfrm>
+            <a:prstGeom prst="rect">
+              <a:avLst/>
+            </a:prstGeom>
+            <a:noFill/>
+          </p:spPr>
+          <p:txBody>
+            <a:bodyPr wrap="square" rtlCol="0">
+              <a:spAutoFit/>
+            </a:bodyPr>
+            <a:lstStyle/>
+            <a:p>
+              <a:r>
+                <a:rPr lang="nl-BE" dirty="0"/>
+                <a:t>Application</a:t>
+              </a:r>
+            </a:p>
+          </p:txBody>
+        </p:sp>
+        <p:sp>
+          <p:nvSpPr>
+            <p:cNvPr id="24" name="Rechthoek 23">
+              <a:extLst>
+                <a:ext uri="{FF2B5EF4-FFF2-40B4-BE49-F238E27FC236}">
+                  <a16:creationId xmlns:a16="http://schemas.microsoft.com/office/drawing/2014/main" id="{F683E1F2-865A-8E65-C881-62FB9AED193C}"/>
+                </a:ext>
+              </a:extLst>
+            </p:cNvPr>
+            <p:cNvSpPr/>
+            <p:nvPr/>
+          </p:nvSpPr>
+          <p:spPr>
+            <a:xfrm>
+              <a:off x="6096000" y="3021249"/>
+              <a:ext cx="1839074" cy="392290"/>
+            </a:xfrm>
+            <a:prstGeom prst="rect">
+              <a:avLst/>
+            </a:prstGeom>
+          </p:spPr>
+          <p:style>
+            <a:lnRef idx="2">
+              <a:schemeClr val="accent2">
+                <a:shade val="15000"/>
+              </a:schemeClr>
+            </a:lnRef>
+            <a:fillRef idx="1">
+              <a:schemeClr val="accent2"/>
+            </a:fillRef>
+            <a:effectRef idx="0">
+              <a:schemeClr val="accent2"/>
+            </a:effectRef>
+            <a:fontRef idx="minor">
+              <a:schemeClr val="lt1"/>
+            </a:fontRef>
+          </p:style>
+          <p:txBody>
+            <a:bodyPr rtlCol="0" anchor="ctr"/>
+            <a:lstStyle/>
+            <a:p>
+              <a:pPr algn="ctr"/>
+              <a:r>
+                <a:rPr lang="nl-BE" dirty="0"/>
+                <a:t>Module</a:t>
+              </a:r>
+            </a:p>
+          </p:txBody>
+        </p:sp>
+        <p:sp>
+          <p:nvSpPr>
+            <p:cNvPr id="25" name="Rechthoek 24">
+              <a:extLst>
+                <a:ext uri="{FF2B5EF4-FFF2-40B4-BE49-F238E27FC236}">
+                  <a16:creationId xmlns:a16="http://schemas.microsoft.com/office/drawing/2014/main" id="{231D23AF-D22D-A661-B909-799640B5C4C8}"/>
+                </a:ext>
+              </a:extLst>
+            </p:cNvPr>
+            <p:cNvSpPr/>
+            <p:nvPr/>
+          </p:nvSpPr>
+          <p:spPr>
+            <a:xfrm>
+              <a:off x="6096000" y="2286438"/>
+              <a:ext cx="1839074" cy="392290"/>
+            </a:xfrm>
+            <a:prstGeom prst="rect">
+              <a:avLst/>
+            </a:prstGeom>
+          </p:spPr>
+          <p:style>
+            <a:lnRef idx="2">
+              <a:schemeClr val="accent2">
+                <a:shade val="15000"/>
+              </a:schemeClr>
+            </a:lnRef>
+            <a:fillRef idx="1">
+              <a:schemeClr val="accent2"/>
+            </a:fillRef>
+            <a:effectRef idx="0">
+              <a:schemeClr val="accent2"/>
+            </a:effectRef>
+            <a:fontRef idx="minor">
+              <a:schemeClr val="lt1"/>
+            </a:fontRef>
+          </p:style>
+          <p:txBody>
+            <a:bodyPr rtlCol="0" anchor="ctr"/>
+            <a:lstStyle/>
+            <a:p>
+              <a:pPr algn="ctr"/>
+              <a:r>
+                <a:rPr lang="nl-BE" dirty="0"/>
+                <a:t>Module</a:t>
+              </a:r>
+            </a:p>
+          </p:txBody>
+        </p:sp>
+        <p:sp>
+          <p:nvSpPr>
+            <p:cNvPr id="26" name="Rechthoek 25">
+              <a:extLst>
+                <a:ext uri="{FF2B5EF4-FFF2-40B4-BE49-F238E27FC236}">
+                  <a16:creationId xmlns:a16="http://schemas.microsoft.com/office/drawing/2014/main" id="{6FE61137-01DA-AE4B-746B-ED09F97B8A32}"/>
+                </a:ext>
+              </a:extLst>
+            </p:cNvPr>
+            <p:cNvSpPr/>
+            <p:nvPr/>
+          </p:nvSpPr>
+          <p:spPr>
+            <a:xfrm>
+              <a:off x="6096000" y="1520047"/>
+              <a:ext cx="1839074" cy="392290"/>
+            </a:xfrm>
+            <a:prstGeom prst="rect">
+              <a:avLst/>
+            </a:prstGeom>
+          </p:spPr>
+          <p:style>
+            <a:lnRef idx="2">
+              <a:schemeClr val="accent2">
+                <a:shade val="15000"/>
+              </a:schemeClr>
+            </a:lnRef>
+            <a:fillRef idx="1">
+              <a:schemeClr val="accent2"/>
+            </a:fillRef>
+            <a:effectRef idx="0">
+              <a:schemeClr val="accent2"/>
+            </a:effectRef>
+            <a:fontRef idx="minor">
+              <a:schemeClr val="lt1"/>
+            </a:fontRef>
+          </p:style>
+          <p:txBody>
+            <a:bodyPr rtlCol="0" anchor="ctr"/>
+            <a:lstStyle/>
+            <a:p>
+              <a:pPr algn="ctr"/>
+              <a:r>
+                <a:rPr lang="nl-BE" dirty="0"/>
+                <a:t>Module</a:t>
+              </a:r>
+            </a:p>
+          </p:txBody>
+        </p:sp>
+        <p:sp>
+          <p:nvSpPr>
+            <p:cNvPr id="27" name="Rechthoek 26">
+              <a:extLst>
+                <a:ext uri="{FF2B5EF4-FFF2-40B4-BE49-F238E27FC236}">
+                  <a16:creationId xmlns:a16="http://schemas.microsoft.com/office/drawing/2014/main" id="{3BC85EFA-8EC1-7990-32B2-27C0DAD5B5FB}"/>
+                </a:ext>
+              </a:extLst>
+            </p:cNvPr>
+            <p:cNvSpPr/>
+            <p:nvPr/>
+          </p:nvSpPr>
+          <p:spPr>
+            <a:xfrm>
+              <a:off x="6096000" y="761422"/>
+              <a:ext cx="1839074" cy="392290"/>
+            </a:xfrm>
+            <a:prstGeom prst="rect">
+              <a:avLst/>
+            </a:prstGeom>
+          </p:spPr>
+          <p:style>
+            <a:lnRef idx="2">
+              <a:schemeClr val="accent2">
+                <a:shade val="15000"/>
+              </a:schemeClr>
+            </a:lnRef>
+            <a:fillRef idx="1">
+              <a:schemeClr val="accent2"/>
+            </a:fillRef>
+            <a:effectRef idx="0">
+              <a:schemeClr val="accent2"/>
+            </a:effectRef>
+            <a:fontRef idx="minor">
+              <a:schemeClr val="lt1"/>
+            </a:fontRef>
+          </p:style>
+          <p:txBody>
+            <a:bodyPr rtlCol="0" anchor="ctr"/>
+            <a:lstStyle/>
+            <a:p>
+              <a:pPr algn="ctr"/>
+              <a:r>
+                <a:rPr lang="nl-BE" dirty="0"/>
+                <a:t>Module</a:t>
+              </a:r>
+            </a:p>
+          </p:txBody>
+        </p:sp>
+      </p:grpSp>
+      <p:sp>
+        <p:nvSpPr>
+          <p:cNvPr id="18" name="Rechthoek 17">
+            <a:extLst>
+              <a:ext uri="{FF2B5EF4-FFF2-40B4-BE49-F238E27FC236}">
+                <a16:creationId xmlns:a16="http://schemas.microsoft.com/office/drawing/2014/main" id="{C78E0DA4-18C3-172D-577D-A74AE74C58C5}"/>
+              </a:ext>
+            </a:extLst>
+          </p:cNvPr>
+          <p:cNvSpPr/>
+          <p:nvPr/>
+        </p:nvSpPr>
+        <p:spPr>
+          <a:xfrm>
+            <a:off x="7717607" y="287676"/>
+            <a:ext cx="3071964" cy="4536042"/>
           </a:xfrm>
           <a:prstGeom prst="rect">
             <a:avLst/>
@@ -3858,10 +4310,10 @@
       </p:sp>
       <p:sp>
         <p:nvSpPr>
-          <p:cNvPr id="15" name="Tekstvak 14">
-            <a:extLst>
-              <a:ext uri="{FF2B5EF4-FFF2-40B4-BE49-F238E27FC236}">
-                <a16:creationId xmlns:a16="http://schemas.microsoft.com/office/drawing/2014/main" id="{1878EA9C-F002-BA3A-5253-5DF13AB61D1C}"/>
+          <p:cNvPr id="19" name="Tekstvak 18">
+            <a:extLst>
+              <a:ext uri="{FF2B5EF4-FFF2-40B4-BE49-F238E27FC236}">
+                <a16:creationId xmlns:a16="http://schemas.microsoft.com/office/drawing/2014/main" id="{2E697D4B-05EF-429A-DCA4-6A092AC43723}"/>
               </a:ext>
             </a:extLst>
           </p:cNvPr>
@@ -3870,8 +4322,8 @@
         </p:nvSpPr>
         <p:spPr>
           <a:xfrm>
-            <a:off x="4042880" y="4065619"/>
-            <a:ext cx="1078787" cy="369332"/>
+            <a:off x="8280973" y="4342171"/>
+            <a:ext cx="2001667" cy="369332"/>
           </a:xfrm>
           <a:prstGeom prst="rect">
             <a:avLst/>
@@ -3884,19 +4336,20 @@
           </a:bodyPr>
           <a:lstStyle/>
           <a:p>
+            <a:pPr algn="ctr"/>
             <a:r>
               <a:rPr lang="nl-BE" dirty="0"/>
-              <a:t>Shared</a:t>
-            </a:r>
-          </a:p>
-        </p:txBody>
-      </p:sp>
-      <p:sp>
-        <p:nvSpPr>
-          <p:cNvPr id="16" name="Rechthoek 15">
-            <a:extLst>
-              <a:ext uri="{FF2B5EF4-FFF2-40B4-BE49-F238E27FC236}">
-                <a16:creationId xmlns:a16="http://schemas.microsoft.com/office/drawing/2014/main" id="{EDCCFDFC-AC96-659C-319C-DB14A7AC09A7}"/>
+              <a:t>Domain A</a:t>
+            </a:r>
+          </a:p>
+        </p:txBody>
+      </p:sp>
+      <p:sp>
+        <p:nvSpPr>
+          <p:cNvPr id="28" name="Rechthoek 27">
+            <a:extLst>
+              <a:ext uri="{FF2B5EF4-FFF2-40B4-BE49-F238E27FC236}">
+                <a16:creationId xmlns:a16="http://schemas.microsoft.com/office/drawing/2014/main" id="{F490BAE2-FB33-7413-7C75-BF979779E795}"/>
               </a:ext>
             </a:extLst>
           </p:cNvPr>
@@ -3905,289 +4358,8 @@
         </p:nvSpPr>
         <p:spPr>
           <a:xfrm>
-            <a:off x="5993259" y="287676"/>
-            <a:ext cx="2044557" cy="4536042"/>
-          </a:xfrm>
-          <a:prstGeom prst="rect">
-            <a:avLst/>
-          </a:prstGeom>
-          <a:solidFill>
-            <a:schemeClr val="accent1">
-              <a:alpha val="46000"/>
-            </a:schemeClr>
-          </a:solidFill>
-        </p:spPr>
-        <p:style>
-          <a:lnRef idx="2">
-            <a:schemeClr val="accent1">
-              <a:shade val="15000"/>
-            </a:schemeClr>
-          </a:lnRef>
-          <a:fillRef idx="1">
-            <a:schemeClr val="accent1"/>
-          </a:fillRef>
-          <a:effectRef idx="0">
-            <a:schemeClr val="accent1"/>
-          </a:effectRef>
-          <a:fontRef idx="minor">
-            <a:schemeClr val="lt1"/>
-          </a:fontRef>
-        </p:style>
-        <p:txBody>
-          <a:bodyPr rtlCol="0" anchor="ctr"/>
-          <a:lstStyle/>
-          <a:p>
-            <a:pPr algn="ctr"/>
-            <a:endParaRPr lang="nl-BE">
-              <a:ln w="0"/>
-              <a:solidFill>
-                <a:schemeClr val="tx1"/>
-              </a:solidFill>
-              <a:effectLst>
-                <a:outerShdw blurRad="38100" dist="19050" dir="2700000" algn="tl" rotWithShape="0">
-                  <a:schemeClr val="dk1">
-                    <a:alpha val="40000"/>
-                  </a:schemeClr>
-                </a:outerShdw>
-              </a:effectLst>
-            </a:endParaRPr>
-          </a:p>
-        </p:txBody>
-      </p:sp>
-      <p:sp>
-        <p:nvSpPr>
-          <p:cNvPr id="17" name="Tekstvak 16">
-            <a:extLst>
-              <a:ext uri="{FF2B5EF4-FFF2-40B4-BE49-F238E27FC236}">
-                <a16:creationId xmlns:a16="http://schemas.microsoft.com/office/drawing/2014/main" id="{E1D32CC7-1FDD-1AF9-5DDA-5D1C359FE826}"/>
-              </a:ext>
-            </a:extLst>
-          </p:cNvPr>
-          <p:cNvSpPr txBox="1"/>
-          <p:nvPr/>
-        </p:nvSpPr>
-        <p:spPr>
-          <a:xfrm>
-            <a:off x="6369979" y="4065619"/>
-            <a:ext cx="1332217" cy="369332"/>
-          </a:xfrm>
-          <a:prstGeom prst="rect">
-            <a:avLst/>
-          </a:prstGeom>
-          <a:noFill/>
-        </p:spPr>
-        <p:txBody>
-          <a:bodyPr wrap="square" rtlCol="0">
-            <a:spAutoFit/>
-          </a:bodyPr>
-          <a:lstStyle/>
-          <a:p>
-            <a:r>
-              <a:rPr lang="nl-BE" dirty="0"/>
-              <a:t>Application</a:t>
-            </a:r>
-          </a:p>
-        </p:txBody>
-      </p:sp>
-      <p:sp>
-        <p:nvSpPr>
-          <p:cNvPr id="18" name="Rechthoek 17">
-            <a:extLst>
-              <a:ext uri="{FF2B5EF4-FFF2-40B4-BE49-F238E27FC236}">
-                <a16:creationId xmlns:a16="http://schemas.microsoft.com/office/drawing/2014/main" id="{C78E0DA4-18C3-172D-577D-A74AE74C58C5}"/>
-              </a:ext>
-            </a:extLst>
-          </p:cNvPr>
-          <p:cNvSpPr/>
-          <p:nvPr/>
-        </p:nvSpPr>
-        <p:spPr>
-          <a:xfrm>
-            <a:off x="8323780" y="287676"/>
-            <a:ext cx="2044557" cy="4536042"/>
-          </a:xfrm>
-          <a:prstGeom prst="rect">
-            <a:avLst/>
-          </a:prstGeom>
-          <a:solidFill>
-            <a:schemeClr val="accent1">
-              <a:alpha val="46000"/>
-            </a:schemeClr>
-          </a:solidFill>
-        </p:spPr>
-        <p:style>
-          <a:lnRef idx="2">
-            <a:schemeClr val="accent1">
-              <a:shade val="15000"/>
-            </a:schemeClr>
-          </a:lnRef>
-          <a:fillRef idx="1">
-            <a:schemeClr val="accent1"/>
-          </a:fillRef>
-          <a:effectRef idx="0">
-            <a:schemeClr val="accent1"/>
-          </a:effectRef>
-          <a:fontRef idx="minor">
-            <a:schemeClr val="lt1"/>
-          </a:fontRef>
-        </p:style>
-        <p:txBody>
-          <a:bodyPr rtlCol="0" anchor="ctr"/>
-          <a:lstStyle/>
-          <a:p>
-            <a:pPr algn="ctr"/>
-            <a:endParaRPr lang="nl-BE">
-              <a:ln w="0"/>
-              <a:solidFill>
-                <a:schemeClr val="tx1"/>
-              </a:solidFill>
-              <a:effectLst>
-                <a:outerShdw blurRad="38100" dist="19050" dir="2700000" algn="tl" rotWithShape="0">
-                  <a:schemeClr val="dk1">
-                    <a:alpha val="40000"/>
-                  </a:schemeClr>
-                </a:outerShdw>
-              </a:effectLst>
-            </a:endParaRPr>
-          </a:p>
-        </p:txBody>
-      </p:sp>
-      <p:sp>
-        <p:nvSpPr>
-          <p:cNvPr id="19" name="Tekstvak 18">
-            <a:extLst>
-              <a:ext uri="{FF2B5EF4-FFF2-40B4-BE49-F238E27FC236}">
-                <a16:creationId xmlns:a16="http://schemas.microsoft.com/office/drawing/2014/main" id="{2E697D4B-05EF-429A-DCA4-6A092AC43723}"/>
-              </a:ext>
-            </a:extLst>
-          </p:cNvPr>
-          <p:cNvSpPr txBox="1"/>
-          <p:nvPr/>
-        </p:nvSpPr>
-        <p:spPr>
-          <a:xfrm>
-            <a:off x="8679949" y="4005528"/>
-            <a:ext cx="1332217" cy="369332"/>
-          </a:xfrm>
-          <a:prstGeom prst="rect">
-            <a:avLst/>
-          </a:prstGeom>
-          <a:noFill/>
-        </p:spPr>
-        <p:txBody>
-          <a:bodyPr wrap="square" rtlCol="0">
-            <a:spAutoFit/>
-          </a:bodyPr>
-          <a:lstStyle/>
-          <a:p>
-            <a:r>
-              <a:rPr lang="nl-BE" dirty="0"/>
-              <a:t>Domain A</a:t>
-            </a:r>
-          </a:p>
-        </p:txBody>
-      </p:sp>
-      <p:sp>
-        <p:nvSpPr>
-          <p:cNvPr id="20" name="Pijl: rechts 19">
-            <a:extLst>
-              <a:ext uri="{FF2B5EF4-FFF2-40B4-BE49-F238E27FC236}">
-                <a16:creationId xmlns:a16="http://schemas.microsoft.com/office/drawing/2014/main" id="{47570352-4071-B527-2D50-0009671B9B3F}"/>
-              </a:ext>
-            </a:extLst>
-          </p:cNvPr>
-          <p:cNvSpPr/>
-          <p:nvPr/>
-        </p:nvSpPr>
-        <p:spPr>
-          <a:xfrm rot="10800000">
-            <a:off x="10483063" y="4005527"/>
-            <a:ext cx="482885" cy="369332"/>
-          </a:xfrm>
-          <a:prstGeom prst="rightArrow">
-            <a:avLst/>
-          </a:prstGeom>
-        </p:spPr>
-        <p:style>
-          <a:lnRef idx="2">
-            <a:schemeClr val="accent1">
-              <a:shade val="15000"/>
-            </a:schemeClr>
-          </a:lnRef>
-          <a:fillRef idx="1">
-            <a:schemeClr val="accent1"/>
-          </a:fillRef>
-          <a:effectRef idx="0">
-            <a:schemeClr val="accent1"/>
-          </a:effectRef>
-          <a:fontRef idx="minor">
-            <a:schemeClr val="lt1"/>
-          </a:fontRef>
-        </p:style>
-        <p:txBody>
-          <a:bodyPr rtlCol="0" anchor="ctr"/>
-          <a:lstStyle/>
-          <a:p>
-            <a:pPr algn="ctr"/>
-            <a:endParaRPr lang="nl-BE"/>
-          </a:p>
-        </p:txBody>
-      </p:sp>
-      <p:sp>
-        <p:nvSpPr>
-          <p:cNvPr id="21" name="Tekstvak 20">
-            <a:extLst>
-              <a:ext uri="{FF2B5EF4-FFF2-40B4-BE49-F238E27FC236}">
-                <a16:creationId xmlns:a16="http://schemas.microsoft.com/office/drawing/2014/main" id="{64DEB639-DF27-6162-5300-A8995A04D7C6}"/>
-              </a:ext>
-            </a:extLst>
-          </p:cNvPr>
-          <p:cNvSpPr txBox="1"/>
-          <p:nvPr/>
-        </p:nvSpPr>
-        <p:spPr>
-          <a:xfrm>
-            <a:off x="11080674" y="4005527"/>
-            <a:ext cx="1157553" cy="369332"/>
-          </a:xfrm>
-          <a:prstGeom prst="rect">
-            <a:avLst/>
-          </a:prstGeom>
-          <a:noFill/>
-        </p:spPr>
-        <p:txBody>
-          <a:bodyPr wrap="square" rtlCol="0">
-            <a:spAutoFit/>
-          </a:bodyPr>
-          <a:lstStyle/>
-          <a:p>
-            <a:r>
-              <a:rPr lang="nl-BE" dirty="0">
-                <a:solidFill>
-                  <a:srgbClr val="FF0000"/>
-                </a:solidFill>
-              </a:rPr>
-              <a:t>Scope</a:t>
-            </a:r>
-          </a:p>
-        </p:txBody>
-      </p:sp>
-      <p:sp>
-        <p:nvSpPr>
-          <p:cNvPr id="2" name="Rechthoek 1">
-            <a:extLst>
-              <a:ext uri="{FF2B5EF4-FFF2-40B4-BE49-F238E27FC236}">
-                <a16:creationId xmlns:a16="http://schemas.microsoft.com/office/drawing/2014/main" id="{B2184774-8200-CFAB-A7BB-895351DC0E5A}"/>
-              </a:ext>
-            </a:extLst>
-          </p:cNvPr>
-          <p:cNvSpPr/>
-          <p:nvPr/>
-        </p:nvSpPr>
-        <p:spPr>
-          <a:xfrm>
-            <a:off x="3657600" y="3036710"/>
-            <a:ext cx="1839074" cy="392290"/>
+            <a:off x="9238176" y="3015594"/>
+            <a:ext cx="1397025" cy="392290"/>
           </a:xfrm>
           <a:prstGeom prst="rect">
             <a:avLst/>
@@ -4223,10 +4395,10 @@
       </p:sp>
       <p:sp>
         <p:nvSpPr>
-          <p:cNvPr id="3" name="Rechthoek 2">
-            <a:extLst>
-              <a:ext uri="{FF2B5EF4-FFF2-40B4-BE49-F238E27FC236}">
-                <a16:creationId xmlns:a16="http://schemas.microsoft.com/office/drawing/2014/main" id="{FB71B165-6FBF-58A2-4E8E-140260D19EB9}"/>
+          <p:cNvPr id="29" name="Rechthoek 28">
+            <a:extLst>
+              <a:ext uri="{FF2B5EF4-FFF2-40B4-BE49-F238E27FC236}">
+                <a16:creationId xmlns:a16="http://schemas.microsoft.com/office/drawing/2014/main" id="{9251F6ED-89ED-87E3-65E0-4045951F248C}"/>
               </a:ext>
             </a:extLst>
           </p:cNvPr>
@@ -4235,8 +4407,8 @@
         </p:nvSpPr>
         <p:spPr>
           <a:xfrm>
-            <a:off x="3657600" y="2301899"/>
-            <a:ext cx="1839074" cy="392290"/>
+            <a:off x="9238176" y="2280783"/>
+            <a:ext cx="1397026" cy="392290"/>
           </a:xfrm>
           <a:prstGeom prst="rect">
             <a:avLst/>
@@ -4272,10 +4444,10 @@
       </p:sp>
       <p:sp>
         <p:nvSpPr>
-          <p:cNvPr id="22" name="Rechthoek 21">
-            <a:extLst>
-              <a:ext uri="{FF2B5EF4-FFF2-40B4-BE49-F238E27FC236}">
-                <a16:creationId xmlns:a16="http://schemas.microsoft.com/office/drawing/2014/main" id="{7E4EE537-A428-E046-94FE-E9A5AFD6288F}"/>
+          <p:cNvPr id="30" name="Rechthoek 29">
+            <a:extLst>
+              <a:ext uri="{FF2B5EF4-FFF2-40B4-BE49-F238E27FC236}">
+                <a16:creationId xmlns:a16="http://schemas.microsoft.com/office/drawing/2014/main" id="{BC921593-519B-D253-0D5D-9F8DAC03D72F}"/>
               </a:ext>
             </a:extLst>
           </p:cNvPr>
@@ -4284,8 +4456,8 @@
         </p:nvSpPr>
         <p:spPr>
           <a:xfrm>
-            <a:off x="3657600" y="1535508"/>
-            <a:ext cx="1839074" cy="392290"/>
+            <a:off x="9238176" y="1514392"/>
+            <a:ext cx="1397026" cy="392290"/>
           </a:xfrm>
           <a:prstGeom prst="rect">
             <a:avLst/>
@@ -4321,10 +4493,10 @@
       </p:sp>
       <p:sp>
         <p:nvSpPr>
-          <p:cNvPr id="23" name="Rechthoek 22">
-            <a:extLst>
-              <a:ext uri="{FF2B5EF4-FFF2-40B4-BE49-F238E27FC236}">
-                <a16:creationId xmlns:a16="http://schemas.microsoft.com/office/drawing/2014/main" id="{D577167F-2250-C29D-347C-0F062AD7FFBB}"/>
+          <p:cNvPr id="31" name="Rechthoek 30">
+            <a:extLst>
+              <a:ext uri="{FF2B5EF4-FFF2-40B4-BE49-F238E27FC236}">
+                <a16:creationId xmlns:a16="http://schemas.microsoft.com/office/drawing/2014/main" id="{2787310B-CD87-1BB2-7701-90217128F34E}"/>
               </a:ext>
             </a:extLst>
           </p:cNvPr>
@@ -4333,8 +4505,8 @@
         </p:nvSpPr>
         <p:spPr>
           <a:xfrm>
-            <a:off x="3657600" y="776883"/>
-            <a:ext cx="1839074" cy="392290"/>
+            <a:off x="9238176" y="755767"/>
+            <a:ext cx="1397026" cy="392290"/>
           </a:xfrm>
           <a:prstGeom prst="rect">
             <a:avLst/>
@@ -4368,12 +4540,588 @@
           </a:p>
         </p:txBody>
       </p:sp>
-      <p:sp>
-        <p:nvSpPr>
-          <p:cNvPr id="24" name="Rechthoek 23">
-            <a:extLst>
-              <a:ext uri="{FF2B5EF4-FFF2-40B4-BE49-F238E27FC236}">
-                <a16:creationId xmlns:a16="http://schemas.microsoft.com/office/drawing/2014/main" id="{F683E1F2-865A-8E65-C881-62FB9AED193C}"/>
+      <p:cxnSp>
+        <p:nvCxnSpPr>
+          <p:cNvPr id="33" name="Rechte verbindingslijn met pijl 32">
+            <a:extLst>
+              <a:ext uri="{FF2B5EF4-FFF2-40B4-BE49-F238E27FC236}">
+                <a16:creationId xmlns:a16="http://schemas.microsoft.com/office/drawing/2014/main" id="{164AACAB-893F-38F6-C386-39FB389F5368}"/>
+              </a:ext>
+            </a:extLst>
+          </p:cNvPr>
+          <p:cNvCxnSpPr/>
+          <p:nvPr/>
+        </p:nvCxnSpPr>
+        <p:spPr>
+          <a:xfrm>
+            <a:off x="339047" y="2465798"/>
+            <a:ext cx="0" cy="570912"/>
+          </a:xfrm>
+          <a:prstGeom prst="straightConnector1">
+            <a:avLst/>
+          </a:prstGeom>
+          <a:ln>
+            <a:tailEnd type="triangle"/>
+          </a:ln>
+        </p:spPr>
+        <p:style>
+          <a:lnRef idx="2">
+            <a:schemeClr val="accent1"/>
+          </a:lnRef>
+          <a:fillRef idx="0">
+            <a:schemeClr val="accent1"/>
+          </a:fillRef>
+          <a:effectRef idx="1">
+            <a:schemeClr val="accent1"/>
+          </a:effectRef>
+          <a:fontRef idx="minor">
+            <a:schemeClr val="tx1"/>
+          </a:fontRef>
+        </p:style>
+      </p:cxnSp>
+      <p:cxnSp>
+        <p:nvCxnSpPr>
+          <p:cNvPr id="34" name="Rechte verbindingslijn met pijl 33">
+            <a:extLst>
+              <a:ext uri="{FF2B5EF4-FFF2-40B4-BE49-F238E27FC236}">
+                <a16:creationId xmlns:a16="http://schemas.microsoft.com/office/drawing/2014/main" id="{1C148DDD-674A-DEAE-9B93-06D932A20082}"/>
+              </a:ext>
+            </a:extLst>
+          </p:cNvPr>
+          <p:cNvCxnSpPr/>
+          <p:nvPr/>
+        </p:nvCxnSpPr>
+        <p:spPr>
+          <a:xfrm>
+            <a:off x="339047" y="1679506"/>
+            <a:ext cx="0" cy="570912"/>
+          </a:xfrm>
+          <a:prstGeom prst="straightConnector1">
+            <a:avLst/>
+          </a:prstGeom>
+          <a:ln>
+            <a:tailEnd type="triangle"/>
+          </a:ln>
+        </p:spPr>
+        <p:style>
+          <a:lnRef idx="2">
+            <a:schemeClr val="accent1"/>
+          </a:lnRef>
+          <a:fillRef idx="0">
+            <a:schemeClr val="accent1"/>
+          </a:fillRef>
+          <a:effectRef idx="1">
+            <a:schemeClr val="accent1"/>
+          </a:effectRef>
+          <a:fontRef idx="minor">
+            <a:schemeClr val="tx1"/>
+          </a:fontRef>
+        </p:style>
+      </p:cxnSp>
+      <p:cxnSp>
+        <p:nvCxnSpPr>
+          <p:cNvPr id="35" name="Rechte verbindingslijn met pijl 34">
+            <a:extLst>
+              <a:ext uri="{FF2B5EF4-FFF2-40B4-BE49-F238E27FC236}">
+                <a16:creationId xmlns:a16="http://schemas.microsoft.com/office/drawing/2014/main" id="{BC06AFEB-CD71-43D7-A612-B38FB7CDE37C}"/>
+              </a:ext>
+            </a:extLst>
+          </p:cNvPr>
+          <p:cNvCxnSpPr/>
+          <p:nvPr/>
+        </p:nvCxnSpPr>
+        <p:spPr>
+          <a:xfrm>
+            <a:off x="339047" y="964596"/>
+            <a:ext cx="0" cy="570912"/>
+          </a:xfrm>
+          <a:prstGeom prst="straightConnector1">
+            <a:avLst/>
+          </a:prstGeom>
+          <a:ln>
+            <a:tailEnd type="triangle"/>
+          </a:ln>
+        </p:spPr>
+        <p:style>
+          <a:lnRef idx="2">
+            <a:schemeClr val="accent1"/>
+          </a:lnRef>
+          <a:fillRef idx="0">
+            <a:schemeClr val="accent1"/>
+          </a:fillRef>
+          <a:effectRef idx="1">
+            <a:schemeClr val="accent1"/>
+          </a:effectRef>
+          <a:fontRef idx="minor">
+            <a:schemeClr val="tx1"/>
+          </a:fontRef>
+        </p:style>
+      </p:cxnSp>
+      <p:grpSp>
+        <p:nvGrpSpPr>
+          <p:cNvPr id="51" name="Groep 50">
+            <a:extLst>
+              <a:ext uri="{FF2B5EF4-FFF2-40B4-BE49-F238E27FC236}">
+                <a16:creationId xmlns:a16="http://schemas.microsoft.com/office/drawing/2014/main" id="{6E1C31C6-EC27-C290-2830-7B348111CE0C}"/>
+              </a:ext>
+            </a:extLst>
+          </p:cNvPr>
+          <p:cNvGrpSpPr/>
+          <p:nvPr/>
+        </p:nvGrpSpPr>
+        <p:grpSpPr>
+          <a:xfrm>
+            <a:off x="4212406" y="5133326"/>
+            <a:ext cx="4179870" cy="229915"/>
+            <a:chOff x="4982966" y="5133326"/>
+            <a:chExt cx="4179870" cy="229915"/>
+          </a:xfrm>
+        </p:grpSpPr>
+        <p:cxnSp>
+          <p:nvCxnSpPr>
+            <p:cNvPr id="36" name="Rechte verbindingslijn met pijl 35">
+              <a:extLst>
+                <a:ext uri="{FF2B5EF4-FFF2-40B4-BE49-F238E27FC236}">
+                  <a16:creationId xmlns:a16="http://schemas.microsoft.com/office/drawing/2014/main" id="{7FF4C650-CEFC-5151-3ACA-19934AA845E3}"/>
+                </a:ext>
+              </a:extLst>
+            </p:cNvPr>
+            <p:cNvCxnSpPr>
+              <a:cxnSpLocks/>
+            </p:cNvCxnSpPr>
+            <p:nvPr/>
+          </p:nvCxnSpPr>
+          <p:spPr>
+            <a:xfrm flipH="1">
+              <a:off x="4982966" y="5213946"/>
+              <a:ext cx="1357901" cy="0"/>
+            </a:xfrm>
+            <a:prstGeom prst="straightConnector1">
+              <a:avLst/>
+            </a:prstGeom>
+            <a:ln>
+              <a:tailEnd type="triangle"/>
+            </a:ln>
+          </p:spPr>
+          <p:style>
+            <a:lnRef idx="2">
+              <a:schemeClr val="accent1"/>
+            </a:lnRef>
+            <a:fillRef idx="0">
+              <a:schemeClr val="accent1"/>
+            </a:fillRef>
+            <a:effectRef idx="1">
+              <a:schemeClr val="accent1"/>
+            </a:effectRef>
+            <a:fontRef idx="minor">
+              <a:schemeClr val="tx1"/>
+            </a:fontRef>
+          </p:style>
+        </p:cxnSp>
+        <p:cxnSp>
+          <p:nvCxnSpPr>
+            <p:cNvPr id="39" name="Rechte verbindingslijn met pijl 38">
+              <a:extLst>
+                <a:ext uri="{FF2B5EF4-FFF2-40B4-BE49-F238E27FC236}">
+                  <a16:creationId xmlns:a16="http://schemas.microsoft.com/office/drawing/2014/main" id="{6AE51C08-F21C-5815-1977-880EF12CEA8F}"/>
+                </a:ext>
+              </a:extLst>
+            </p:cNvPr>
+            <p:cNvCxnSpPr>
+              <a:cxnSpLocks/>
+            </p:cNvCxnSpPr>
+            <p:nvPr/>
+          </p:nvCxnSpPr>
+          <p:spPr>
+            <a:xfrm flipH="1">
+              <a:off x="4982966" y="5363241"/>
+              <a:ext cx="4179870" cy="0"/>
+            </a:xfrm>
+            <a:prstGeom prst="straightConnector1">
+              <a:avLst/>
+            </a:prstGeom>
+            <a:ln>
+              <a:tailEnd type="triangle"/>
+            </a:ln>
+          </p:spPr>
+          <p:style>
+            <a:lnRef idx="2">
+              <a:schemeClr val="accent1"/>
+            </a:lnRef>
+            <a:fillRef idx="0">
+              <a:schemeClr val="accent1"/>
+            </a:fillRef>
+            <a:effectRef idx="1">
+              <a:schemeClr val="accent1"/>
+            </a:effectRef>
+            <a:fontRef idx="minor">
+              <a:schemeClr val="tx1"/>
+            </a:fontRef>
+          </p:style>
+        </p:cxnSp>
+        <p:cxnSp>
+          <p:nvCxnSpPr>
+            <p:cNvPr id="41" name="Rechte verbindingslijn met pijl 40">
+              <a:extLst>
+                <a:ext uri="{FF2B5EF4-FFF2-40B4-BE49-F238E27FC236}">
+                  <a16:creationId xmlns:a16="http://schemas.microsoft.com/office/drawing/2014/main" id="{B13E26D3-5028-CC99-C827-ADA7C416966E}"/>
+                </a:ext>
+              </a:extLst>
+            </p:cNvPr>
+            <p:cNvCxnSpPr>
+              <a:cxnSpLocks/>
+            </p:cNvCxnSpPr>
+            <p:nvPr/>
+          </p:nvCxnSpPr>
+          <p:spPr>
+            <a:xfrm flipV="1">
+              <a:off x="7640548" y="5133326"/>
+              <a:ext cx="1410985" cy="11231"/>
+            </a:xfrm>
+            <a:prstGeom prst="straightConnector1">
+              <a:avLst/>
+            </a:prstGeom>
+            <a:ln>
+              <a:tailEnd type="triangle"/>
+            </a:ln>
+          </p:spPr>
+          <p:style>
+            <a:lnRef idx="2">
+              <a:schemeClr val="accent1"/>
+            </a:lnRef>
+            <a:fillRef idx="0">
+              <a:schemeClr val="accent1"/>
+            </a:fillRef>
+            <a:effectRef idx="1">
+              <a:schemeClr val="accent1"/>
+            </a:effectRef>
+            <a:fontRef idx="minor">
+              <a:schemeClr val="tx1"/>
+            </a:fontRef>
+          </p:style>
+        </p:cxnSp>
+      </p:grpSp>
+      <p:grpSp>
+        <p:nvGrpSpPr>
+          <p:cNvPr id="49" name="Groep 48">
+            <a:extLst>
+              <a:ext uri="{FF2B5EF4-FFF2-40B4-BE49-F238E27FC236}">
+                <a16:creationId xmlns:a16="http://schemas.microsoft.com/office/drawing/2014/main" id="{1A6DE813-7168-2D05-FF3D-A61FB5CCFD61}"/>
+              </a:ext>
+            </a:extLst>
+          </p:cNvPr>
+          <p:cNvGrpSpPr/>
+          <p:nvPr/>
+        </p:nvGrpSpPr>
+        <p:grpSpPr>
+          <a:xfrm>
+            <a:off x="2953823" y="287676"/>
+            <a:ext cx="2044557" cy="4536042"/>
+            <a:chOff x="3559996" y="287676"/>
+            <a:chExt cx="2044557" cy="4536042"/>
+          </a:xfrm>
+        </p:grpSpPr>
+        <p:sp>
+          <p:nvSpPr>
+            <p:cNvPr id="14" name="Rechthoek 13">
+              <a:extLst>
+                <a:ext uri="{FF2B5EF4-FFF2-40B4-BE49-F238E27FC236}">
+                  <a16:creationId xmlns:a16="http://schemas.microsoft.com/office/drawing/2014/main" id="{3A2A82CD-683D-7B18-03BD-ED04EDC78E83}"/>
+                </a:ext>
+              </a:extLst>
+            </p:cNvPr>
+            <p:cNvSpPr/>
+            <p:nvPr/>
+          </p:nvSpPr>
+          <p:spPr>
+            <a:xfrm>
+              <a:off x="3559996" y="287676"/>
+              <a:ext cx="2044557" cy="4536042"/>
+            </a:xfrm>
+            <a:prstGeom prst="rect">
+              <a:avLst/>
+            </a:prstGeom>
+            <a:solidFill>
+              <a:schemeClr val="accent1">
+                <a:alpha val="46000"/>
+              </a:schemeClr>
+            </a:solidFill>
+          </p:spPr>
+          <p:style>
+            <a:lnRef idx="2">
+              <a:schemeClr val="accent1">
+                <a:shade val="15000"/>
+              </a:schemeClr>
+            </a:lnRef>
+            <a:fillRef idx="1">
+              <a:schemeClr val="accent1"/>
+            </a:fillRef>
+            <a:effectRef idx="0">
+              <a:schemeClr val="accent1"/>
+            </a:effectRef>
+            <a:fontRef idx="minor">
+              <a:schemeClr val="lt1"/>
+            </a:fontRef>
+          </p:style>
+          <p:txBody>
+            <a:bodyPr rtlCol="0" anchor="ctr"/>
+            <a:lstStyle/>
+            <a:p>
+              <a:pPr algn="ctr"/>
+              <a:endParaRPr lang="nl-BE">
+                <a:ln w="0"/>
+                <a:solidFill>
+                  <a:schemeClr val="tx1"/>
+                </a:solidFill>
+                <a:effectLst>
+                  <a:outerShdw blurRad="38100" dist="19050" dir="2700000" algn="tl" rotWithShape="0">
+                    <a:schemeClr val="dk1">
+                      <a:alpha val="40000"/>
+                    </a:schemeClr>
+                  </a:outerShdw>
+                </a:effectLst>
+              </a:endParaRPr>
+            </a:p>
+          </p:txBody>
+        </p:sp>
+        <p:sp>
+          <p:nvSpPr>
+            <p:cNvPr id="2" name="Rechthoek 1">
+              <a:extLst>
+                <a:ext uri="{FF2B5EF4-FFF2-40B4-BE49-F238E27FC236}">
+                  <a16:creationId xmlns:a16="http://schemas.microsoft.com/office/drawing/2014/main" id="{B2184774-8200-CFAB-A7BB-895351DC0E5A}"/>
+                </a:ext>
+              </a:extLst>
+            </p:cNvPr>
+            <p:cNvSpPr/>
+            <p:nvPr/>
+          </p:nvSpPr>
+          <p:spPr>
+            <a:xfrm>
+              <a:off x="3657600" y="3036710"/>
+              <a:ext cx="1839074" cy="392290"/>
+            </a:xfrm>
+            <a:prstGeom prst="rect">
+              <a:avLst/>
+            </a:prstGeom>
+          </p:spPr>
+          <p:style>
+            <a:lnRef idx="2">
+              <a:schemeClr val="accent2">
+                <a:shade val="15000"/>
+              </a:schemeClr>
+            </a:lnRef>
+            <a:fillRef idx="1">
+              <a:schemeClr val="accent2"/>
+            </a:fillRef>
+            <a:effectRef idx="0">
+              <a:schemeClr val="accent2"/>
+            </a:effectRef>
+            <a:fontRef idx="minor">
+              <a:schemeClr val="lt1"/>
+            </a:fontRef>
+          </p:style>
+          <p:txBody>
+            <a:bodyPr rtlCol="0" anchor="ctr"/>
+            <a:lstStyle/>
+            <a:p>
+              <a:pPr algn="ctr"/>
+              <a:r>
+                <a:rPr lang="nl-BE" dirty="0"/>
+                <a:t>Module</a:t>
+              </a:r>
+            </a:p>
+          </p:txBody>
+        </p:sp>
+        <p:sp>
+          <p:nvSpPr>
+            <p:cNvPr id="3" name="Rechthoek 2">
+              <a:extLst>
+                <a:ext uri="{FF2B5EF4-FFF2-40B4-BE49-F238E27FC236}">
+                  <a16:creationId xmlns:a16="http://schemas.microsoft.com/office/drawing/2014/main" id="{FB71B165-6FBF-58A2-4E8E-140260D19EB9}"/>
+                </a:ext>
+              </a:extLst>
+            </p:cNvPr>
+            <p:cNvSpPr/>
+            <p:nvPr/>
+          </p:nvSpPr>
+          <p:spPr>
+            <a:xfrm>
+              <a:off x="3657600" y="2301899"/>
+              <a:ext cx="1839074" cy="392290"/>
+            </a:xfrm>
+            <a:prstGeom prst="rect">
+              <a:avLst/>
+            </a:prstGeom>
+          </p:spPr>
+          <p:style>
+            <a:lnRef idx="2">
+              <a:schemeClr val="accent2">
+                <a:shade val="15000"/>
+              </a:schemeClr>
+            </a:lnRef>
+            <a:fillRef idx="1">
+              <a:schemeClr val="accent2"/>
+            </a:fillRef>
+            <a:effectRef idx="0">
+              <a:schemeClr val="accent2"/>
+            </a:effectRef>
+            <a:fontRef idx="minor">
+              <a:schemeClr val="lt1"/>
+            </a:fontRef>
+          </p:style>
+          <p:txBody>
+            <a:bodyPr rtlCol="0" anchor="ctr"/>
+            <a:lstStyle/>
+            <a:p>
+              <a:pPr algn="ctr"/>
+              <a:r>
+                <a:rPr lang="nl-BE" dirty="0"/>
+                <a:t>Module</a:t>
+              </a:r>
+            </a:p>
+          </p:txBody>
+        </p:sp>
+        <p:sp>
+          <p:nvSpPr>
+            <p:cNvPr id="22" name="Rechthoek 21">
+              <a:extLst>
+                <a:ext uri="{FF2B5EF4-FFF2-40B4-BE49-F238E27FC236}">
+                  <a16:creationId xmlns:a16="http://schemas.microsoft.com/office/drawing/2014/main" id="{7E4EE537-A428-E046-94FE-E9A5AFD6288F}"/>
+                </a:ext>
+              </a:extLst>
+            </p:cNvPr>
+            <p:cNvSpPr/>
+            <p:nvPr/>
+          </p:nvSpPr>
+          <p:spPr>
+            <a:xfrm>
+              <a:off x="3657600" y="1535508"/>
+              <a:ext cx="1839074" cy="392290"/>
+            </a:xfrm>
+            <a:prstGeom prst="rect">
+              <a:avLst/>
+            </a:prstGeom>
+          </p:spPr>
+          <p:style>
+            <a:lnRef idx="2">
+              <a:schemeClr val="accent2">
+                <a:shade val="15000"/>
+              </a:schemeClr>
+            </a:lnRef>
+            <a:fillRef idx="1">
+              <a:schemeClr val="accent2"/>
+            </a:fillRef>
+            <a:effectRef idx="0">
+              <a:schemeClr val="accent2"/>
+            </a:effectRef>
+            <a:fontRef idx="minor">
+              <a:schemeClr val="lt1"/>
+            </a:fontRef>
+          </p:style>
+          <p:txBody>
+            <a:bodyPr rtlCol="0" anchor="ctr"/>
+            <a:lstStyle/>
+            <a:p>
+              <a:pPr algn="ctr"/>
+              <a:r>
+                <a:rPr lang="nl-BE" dirty="0"/>
+                <a:t>Module</a:t>
+              </a:r>
+            </a:p>
+          </p:txBody>
+        </p:sp>
+        <p:sp>
+          <p:nvSpPr>
+            <p:cNvPr id="23" name="Rechthoek 22">
+              <a:extLst>
+                <a:ext uri="{FF2B5EF4-FFF2-40B4-BE49-F238E27FC236}">
+                  <a16:creationId xmlns:a16="http://schemas.microsoft.com/office/drawing/2014/main" id="{D577167F-2250-C29D-347C-0F062AD7FFBB}"/>
+                </a:ext>
+              </a:extLst>
+            </p:cNvPr>
+            <p:cNvSpPr/>
+            <p:nvPr/>
+          </p:nvSpPr>
+          <p:spPr>
+            <a:xfrm>
+              <a:off x="3657600" y="776883"/>
+              <a:ext cx="1839074" cy="392290"/>
+            </a:xfrm>
+            <a:prstGeom prst="rect">
+              <a:avLst/>
+            </a:prstGeom>
+          </p:spPr>
+          <p:style>
+            <a:lnRef idx="2">
+              <a:schemeClr val="accent2">
+                <a:shade val="15000"/>
+              </a:schemeClr>
+            </a:lnRef>
+            <a:fillRef idx="1">
+              <a:schemeClr val="accent2"/>
+            </a:fillRef>
+            <a:effectRef idx="0">
+              <a:schemeClr val="accent2"/>
+            </a:effectRef>
+            <a:fontRef idx="minor">
+              <a:schemeClr val="lt1"/>
+            </a:fontRef>
+          </p:style>
+          <p:txBody>
+            <a:bodyPr rtlCol="0" anchor="ctr"/>
+            <a:lstStyle/>
+            <a:p>
+              <a:pPr algn="ctr"/>
+              <a:r>
+                <a:rPr lang="nl-BE" dirty="0"/>
+                <a:t>Module</a:t>
+              </a:r>
+            </a:p>
+          </p:txBody>
+        </p:sp>
+        <p:sp>
+          <p:nvSpPr>
+            <p:cNvPr id="15" name="Tekstvak 14">
+              <a:extLst>
+                <a:ext uri="{FF2B5EF4-FFF2-40B4-BE49-F238E27FC236}">
+                  <a16:creationId xmlns:a16="http://schemas.microsoft.com/office/drawing/2014/main" id="{1878EA9C-F002-BA3A-5253-5DF13AB61D1C}"/>
+                </a:ext>
+              </a:extLst>
+            </p:cNvPr>
+            <p:cNvSpPr txBox="1"/>
+            <p:nvPr/>
+          </p:nvSpPr>
+          <p:spPr>
+            <a:xfrm>
+              <a:off x="4042880" y="4065619"/>
+              <a:ext cx="1078787" cy="369332"/>
+            </a:xfrm>
+            <a:prstGeom prst="rect">
+              <a:avLst/>
+            </a:prstGeom>
+            <a:noFill/>
+          </p:spPr>
+          <p:txBody>
+            <a:bodyPr wrap="square" rtlCol="0">
+              <a:spAutoFit/>
+            </a:bodyPr>
+            <a:lstStyle/>
+            <a:p>
+              <a:r>
+                <a:rPr lang="nl-BE" dirty="0"/>
+                <a:t>Shared</a:t>
+              </a:r>
+            </a:p>
+          </p:txBody>
+        </p:sp>
+      </p:grpSp>
+      <p:sp>
+        <p:nvSpPr>
+          <p:cNvPr id="52" name="Rechthoek 51">
+            <a:extLst>
+              <a:ext uri="{FF2B5EF4-FFF2-40B4-BE49-F238E27FC236}">
+                <a16:creationId xmlns:a16="http://schemas.microsoft.com/office/drawing/2014/main" id="{4233F07D-467C-2D6E-5A13-09285EAB3195}"/>
               </a:ext>
             </a:extLst>
           </p:cNvPr>
@@ -4382,8 +5130,54 @@
         </p:nvSpPr>
         <p:spPr>
           <a:xfrm>
-            <a:off x="6096000" y="3021249"/>
-            <a:ext cx="1839074" cy="392290"/>
+            <a:off x="7880279" y="421240"/>
+            <a:ext cx="1203527" cy="3808716"/>
+          </a:xfrm>
+          <a:prstGeom prst="rect">
+            <a:avLst/>
+          </a:prstGeom>
+        </p:spPr>
+        <p:style>
+          <a:lnRef idx="2">
+            <a:schemeClr val="accent1">
+              <a:shade val="15000"/>
+            </a:schemeClr>
+          </a:lnRef>
+          <a:fillRef idx="1">
+            <a:schemeClr val="accent1"/>
+          </a:fillRef>
+          <a:effectRef idx="0">
+            <a:schemeClr val="accent1"/>
+          </a:effectRef>
+          <a:fontRef idx="minor">
+            <a:schemeClr val="lt1"/>
+          </a:fontRef>
+        </p:style>
+        <p:txBody>
+          <a:bodyPr rtlCol="0" anchor="ctr"/>
+          <a:lstStyle/>
+          <a:p>
+            <a:pPr algn="ctr"/>
+            <a:endParaRPr lang="nl-BE"/>
+          </a:p>
+        </p:txBody>
+      </p:sp>
+      <p:sp>
+        <p:nvSpPr>
+          <p:cNvPr id="53" name="Rechthoek 52">
+            <a:extLst>
+              <a:ext uri="{FF2B5EF4-FFF2-40B4-BE49-F238E27FC236}">
+                <a16:creationId xmlns:a16="http://schemas.microsoft.com/office/drawing/2014/main" id="{4E569F8B-3EF7-BF2B-0A62-B5F25D3CCEBC}"/>
+              </a:ext>
+            </a:extLst>
+          </p:cNvPr>
+          <p:cNvSpPr/>
+          <p:nvPr/>
+        </p:nvSpPr>
+        <p:spPr>
+          <a:xfrm>
+            <a:off x="7972744" y="3013240"/>
+            <a:ext cx="945225" cy="392290"/>
           </a:xfrm>
           <a:prstGeom prst="rect">
             <a:avLst/>
@@ -4419,10 +5213,10 @@
       </p:sp>
       <p:sp>
         <p:nvSpPr>
-          <p:cNvPr id="25" name="Rechthoek 24">
-            <a:extLst>
-              <a:ext uri="{FF2B5EF4-FFF2-40B4-BE49-F238E27FC236}">
-                <a16:creationId xmlns:a16="http://schemas.microsoft.com/office/drawing/2014/main" id="{231D23AF-D22D-A661-B909-799640B5C4C8}"/>
+          <p:cNvPr id="54" name="Rechthoek 53">
+            <a:extLst>
+              <a:ext uri="{FF2B5EF4-FFF2-40B4-BE49-F238E27FC236}">
+                <a16:creationId xmlns:a16="http://schemas.microsoft.com/office/drawing/2014/main" id="{9C0432A3-6EA5-357F-1C2B-A04C82AF3014}"/>
               </a:ext>
             </a:extLst>
           </p:cNvPr>
@@ -4431,8 +5225,8 @@
         </p:nvSpPr>
         <p:spPr>
           <a:xfrm>
-            <a:off x="6096000" y="2286438"/>
-            <a:ext cx="1839074" cy="392290"/>
+            <a:off x="7972744" y="2278429"/>
+            <a:ext cx="945226" cy="392290"/>
           </a:xfrm>
           <a:prstGeom prst="rect">
             <a:avLst/>
@@ -4468,10 +5262,10 @@
       </p:sp>
       <p:sp>
         <p:nvSpPr>
-          <p:cNvPr id="26" name="Rechthoek 25">
-            <a:extLst>
-              <a:ext uri="{FF2B5EF4-FFF2-40B4-BE49-F238E27FC236}">
-                <a16:creationId xmlns:a16="http://schemas.microsoft.com/office/drawing/2014/main" id="{6FE61137-01DA-AE4B-746B-ED09F97B8A32}"/>
+          <p:cNvPr id="55" name="Rechthoek 54">
+            <a:extLst>
+              <a:ext uri="{FF2B5EF4-FFF2-40B4-BE49-F238E27FC236}">
+                <a16:creationId xmlns:a16="http://schemas.microsoft.com/office/drawing/2014/main" id="{88227603-5633-D60F-6139-3C60E59ADE93}"/>
               </a:ext>
             </a:extLst>
           </p:cNvPr>
@@ -4480,8 +5274,8 @@
         </p:nvSpPr>
         <p:spPr>
           <a:xfrm>
-            <a:off x="6096000" y="1520047"/>
-            <a:ext cx="1839074" cy="392290"/>
+            <a:off x="7972744" y="1512038"/>
+            <a:ext cx="945226" cy="392290"/>
           </a:xfrm>
           <a:prstGeom prst="rect">
             <a:avLst/>
@@ -4517,10 +5311,10 @@
       </p:sp>
       <p:sp>
         <p:nvSpPr>
-          <p:cNvPr id="27" name="Rechthoek 26">
-            <a:extLst>
-              <a:ext uri="{FF2B5EF4-FFF2-40B4-BE49-F238E27FC236}">
-                <a16:creationId xmlns:a16="http://schemas.microsoft.com/office/drawing/2014/main" id="{3BC85EFA-8EC1-7990-32B2-27C0DAD5B5FB}"/>
+          <p:cNvPr id="56" name="Rechthoek 55">
+            <a:extLst>
+              <a:ext uri="{FF2B5EF4-FFF2-40B4-BE49-F238E27FC236}">
+                <a16:creationId xmlns:a16="http://schemas.microsoft.com/office/drawing/2014/main" id="{CCEF0CB1-3771-CA87-AF0D-24CA47C97A86}"/>
               </a:ext>
             </a:extLst>
           </p:cNvPr>
@@ -4529,8 +5323,8 @@
         </p:nvSpPr>
         <p:spPr>
           <a:xfrm>
-            <a:off x="6096000" y="761422"/>
-            <a:ext cx="1839074" cy="392290"/>
+            <a:off x="7972744" y="753413"/>
+            <a:ext cx="945226" cy="392290"/>
           </a:xfrm>
           <a:prstGeom prst="rect">
             <a:avLst/>
@@ -4566,197 +5360,45 @@
       </p:sp>
       <p:sp>
         <p:nvSpPr>
-          <p:cNvPr id="28" name="Rechthoek 27">
-            <a:extLst>
-              <a:ext uri="{FF2B5EF4-FFF2-40B4-BE49-F238E27FC236}">
-                <a16:creationId xmlns:a16="http://schemas.microsoft.com/office/drawing/2014/main" id="{F490BAE2-FB33-7413-7C75-BF979779E795}"/>
-              </a:ext>
-            </a:extLst>
-          </p:cNvPr>
-          <p:cNvSpPr/>
+          <p:cNvPr id="57" name="Tekstvak 56">
+            <a:extLst>
+              <a:ext uri="{FF2B5EF4-FFF2-40B4-BE49-F238E27FC236}">
+                <a16:creationId xmlns:a16="http://schemas.microsoft.com/office/drawing/2014/main" id="{C7EE55F7-62E1-10B9-A274-C83A5AB389F1}"/>
+              </a:ext>
+            </a:extLst>
+          </p:cNvPr>
+          <p:cNvSpPr txBox="1"/>
           <p:nvPr/>
         </p:nvSpPr>
         <p:spPr>
           <a:xfrm>
-            <a:off x="8426522" y="3015594"/>
-            <a:ext cx="1839074" cy="392290"/>
+            <a:off x="7880285" y="3713526"/>
+            <a:ext cx="1265166" cy="369332"/>
           </a:xfrm>
           <a:prstGeom prst="rect">
             <a:avLst/>
           </a:prstGeom>
+          <a:noFill/>
         </p:spPr>
-        <p:style>
-          <a:lnRef idx="2">
-            <a:schemeClr val="accent2">
-              <a:shade val="15000"/>
-            </a:schemeClr>
-          </a:lnRef>
-          <a:fillRef idx="1">
-            <a:schemeClr val="accent2"/>
-          </a:fillRef>
-          <a:effectRef idx="0">
-            <a:schemeClr val="accent2"/>
-          </a:effectRef>
-          <a:fontRef idx="minor">
-            <a:schemeClr val="lt1"/>
-          </a:fontRef>
-        </p:style>
-        <p:txBody>
-          <a:bodyPr rtlCol="0" anchor="ctr"/>
-          <a:lstStyle/>
-          <a:p>
-            <a:pPr algn="ctr"/>
-            <a:r>
-              <a:rPr lang="nl-BE" dirty="0"/>
-              <a:t>Module</a:t>
-            </a:r>
-          </a:p>
-        </p:txBody>
-      </p:sp>
-      <p:sp>
-        <p:nvSpPr>
-          <p:cNvPr id="29" name="Rechthoek 28">
-            <a:extLst>
-              <a:ext uri="{FF2B5EF4-FFF2-40B4-BE49-F238E27FC236}">
-                <a16:creationId xmlns:a16="http://schemas.microsoft.com/office/drawing/2014/main" id="{9251F6ED-89ED-87E3-65E0-4045951F248C}"/>
-              </a:ext>
-            </a:extLst>
-          </p:cNvPr>
-          <p:cNvSpPr/>
-          <p:nvPr/>
-        </p:nvSpPr>
-        <p:spPr>
-          <a:xfrm>
-            <a:off x="8426522" y="2280783"/>
-            <a:ext cx="1839074" cy="392290"/>
-          </a:xfrm>
-          <a:prstGeom prst="rect">
-            <a:avLst/>
-          </a:prstGeom>
-        </p:spPr>
-        <p:style>
-          <a:lnRef idx="2">
-            <a:schemeClr val="accent2">
-              <a:shade val="15000"/>
-            </a:schemeClr>
-          </a:lnRef>
-          <a:fillRef idx="1">
-            <a:schemeClr val="accent2"/>
-          </a:fillRef>
-          <a:effectRef idx="0">
-            <a:schemeClr val="accent2"/>
-          </a:effectRef>
-          <a:fontRef idx="minor">
-            <a:schemeClr val="lt1"/>
-          </a:fontRef>
-        </p:style>
-        <p:txBody>
-          <a:bodyPr rtlCol="0" anchor="ctr"/>
-          <a:lstStyle/>
-          <a:p>
-            <a:pPr algn="ctr"/>
-            <a:r>
-              <a:rPr lang="nl-BE" dirty="0"/>
-              <a:t>Module</a:t>
-            </a:r>
-          </a:p>
-        </p:txBody>
-      </p:sp>
-      <p:sp>
-        <p:nvSpPr>
-          <p:cNvPr id="30" name="Rechthoek 29">
-            <a:extLst>
-              <a:ext uri="{FF2B5EF4-FFF2-40B4-BE49-F238E27FC236}">
-                <a16:creationId xmlns:a16="http://schemas.microsoft.com/office/drawing/2014/main" id="{BC921593-519B-D253-0D5D-9F8DAC03D72F}"/>
-              </a:ext>
-            </a:extLst>
-          </p:cNvPr>
-          <p:cNvSpPr/>
-          <p:nvPr/>
-        </p:nvSpPr>
-        <p:spPr>
-          <a:xfrm>
-            <a:off x="8426522" y="1514392"/>
-            <a:ext cx="1839074" cy="392290"/>
-          </a:xfrm>
-          <a:prstGeom prst="rect">
-            <a:avLst/>
-          </a:prstGeom>
-        </p:spPr>
-        <p:style>
-          <a:lnRef idx="2">
-            <a:schemeClr val="accent2">
-              <a:shade val="15000"/>
-            </a:schemeClr>
-          </a:lnRef>
-          <a:fillRef idx="1">
-            <a:schemeClr val="accent2"/>
-          </a:fillRef>
-          <a:effectRef idx="0">
-            <a:schemeClr val="accent2"/>
-          </a:effectRef>
-          <a:fontRef idx="minor">
-            <a:schemeClr val="lt1"/>
-          </a:fontRef>
-        </p:style>
-        <p:txBody>
-          <a:bodyPr rtlCol="0" anchor="ctr"/>
-          <a:lstStyle/>
-          <a:p>
-            <a:pPr algn="ctr"/>
-            <a:r>
-              <a:rPr lang="nl-BE" dirty="0"/>
-              <a:t>Module</a:t>
-            </a:r>
-          </a:p>
-        </p:txBody>
-      </p:sp>
-      <p:sp>
-        <p:nvSpPr>
-          <p:cNvPr id="31" name="Rechthoek 30">
-            <a:extLst>
-              <a:ext uri="{FF2B5EF4-FFF2-40B4-BE49-F238E27FC236}">
-                <a16:creationId xmlns:a16="http://schemas.microsoft.com/office/drawing/2014/main" id="{2787310B-CD87-1BB2-7701-90217128F34E}"/>
-              </a:ext>
-            </a:extLst>
-          </p:cNvPr>
-          <p:cNvSpPr/>
-          <p:nvPr/>
-        </p:nvSpPr>
-        <p:spPr>
-          <a:xfrm>
-            <a:off x="8426522" y="755767"/>
-            <a:ext cx="1839074" cy="392290"/>
-          </a:xfrm>
-          <a:prstGeom prst="rect">
-            <a:avLst/>
-          </a:prstGeom>
-        </p:spPr>
-        <p:style>
-          <a:lnRef idx="2">
-            <a:schemeClr val="accent2">
-              <a:shade val="15000"/>
-            </a:schemeClr>
-          </a:lnRef>
-          <a:fillRef idx="1">
-            <a:schemeClr val="accent2"/>
-          </a:fillRef>
-          <a:effectRef idx="0">
-            <a:schemeClr val="accent2"/>
-          </a:effectRef>
-          <a:fontRef idx="minor">
-            <a:schemeClr val="lt1"/>
-          </a:fontRef>
-        </p:style>
-        <p:txBody>
-          <a:bodyPr rtlCol="0" anchor="ctr"/>
-          <a:lstStyle/>
-          <a:p>
-            <a:pPr algn="ctr"/>
-            <a:r>
-              <a:rPr lang="nl-BE" dirty="0"/>
-              <a:t>Module</a:t>
-            </a:r>
+        <p:txBody>
+          <a:bodyPr wrap="square" rtlCol="0">
+            <a:spAutoFit/>
+          </a:bodyPr>
+          <a:lstStyle/>
+          <a:p>
+            <a:r>
+              <a:rPr lang="nl-BE" dirty="0" err="1">
+                <a:solidFill>
+                  <a:schemeClr val="bg1"/>
+                </a:solidFill>
+              </a:rPr>
+              <a:t>SubScope</a:t>
+            </a:r>
+            <a:endParaRPr lang="nl-BE" dirty="0">
+              <a:solidFill>
+                <a:schemeClr val="bg1"/>
+              </a:solidFill>
+            </a:endParaRPr>
           </a:p>
         </p:txBody>
       </p:sp>

</xml_diff>